<commit_message>
Recitation #4 10/4/19: BinaryStdIn.java, BinaryStdOut.java
</commit_message>
<xml_diff>
--- a/cs1501_rec4_Oct4.pptx
+++ b/cs1501_rec4_Oct4.pptx
@@ -5,7 +5,7 @@
     <p:sldMasterId id="2147483660" r:id="rId1"/>
   </p:sldMasterIdLst>
   <p:notesMasterIdLst>
-    <p:notesMasterId r:id="rId14"/>
+    <p:notesMasterId r:id="rId16"/>
   </p:notesMasterIdLst>
   <p:sldIdLst>
     <p:sldId id="258" r:id="rId2"/>
@@ -20,6 +20,8 @@
     <p:sldId id="292" r:id="rId11"/>
     <p:sldId id="293" r:id="rId12"/>
     <p:sldId id="294" r:id="rId13"/>
+    <p:sldId id="295" r:id="rId14"/>
+    <p:sldId id="296" r:id="rId15"/>
   </p:sldIdLst>
   <p:sldSz cx="9144000" cy="6858000" type="screen4x3"/>
   <p:notesSz cx="6858000" cy="9144000"/>
@@ -4113,7 +4115,7 @@
         <p:spPr>
           <a:xfrm>
             <a:off x="-76201" y="0"/>
-            <a:ext cx="9420225" cy="954107"/>
+            <a:ext cx="8515663" cy="1292662"/>
           </a:xfrm>
           <a:prstGeom prst="rect">
             <a:avLst/>
@@ -4126,15 +4128,7 @@
           <a:lstStyle/>
           <a:p>
             <a:r>
-              <a:rPr lang="en-US" sz="2800" dirty="0" smtClean="0">
-                <a:solidFill>
-                  <a:srgbClr val="002060"/>
-                </a:solidFill>
-              </a:rPr>
-              <a:t>Next: A few comments on </a:t>
-            </a:r>
-            <a:r>
-              <a:rPr lang="en-US" sz="2800" dirty="0" err="1" smtClean="0">
+              <a:rPr lang="en-US" sz="2600" u="sng" dirty="0" err="1" smtClean="0">
                 <a:solidFill>
                   <a:srgbClr val="002060"/>
                 </a:solidFill>
@@ -4142,14 +4136,30 @@
               <a:t>BinaryStdOut</a:t>
             </a:r>
             <a:r>
-              <a:rPr lang="en-US" sz="2800" dirty="0" smtClean="0">
+              <a:rPr lang="en-US" sz="2600" dirty="0" smtClean="0">
                 <a:solidFill>
                   <a:srgbClr val="002060"/>
                 </a:solidFill>
               </a:rPr>
-              <a:t> (more slides later) and on LZW project</a:t>
-            </a:r>
-            <a:endParaRPr lang="en-US" sz="2800" dirty="0">
+              <a:t>: We can use this to write variable length amounts of data to a buffer (additional commands are required in order to write to </a:t>
+            </a:r>
+            <a:r>
+              <a:rPr lang="en-US" sz="2600" dirty="0" err="1" smtClean="0">
+                <a:solidFill>
+                  <a:srgbClr val="002060"/>
+                </a:solidFill>
+              </a:rPr>
+              <a:t>stdout</a:t>
+            </a:r>
+            <a:r>
+              <a:rPr lang="en-US" sz="2600" dirty="0" smtClean="0">
+                <a:solidFill>
+                  <a:srgbClr val="002060"/>
+                </a:solidFill>
+              </a:rPr>
+              <a:t>):</a:t>
+            </a:r>
+            <a:endParaRPr lang="en-US" sz="2600" dirty="0">
               <a:solidFill>
                 <a:srgbClr val="002060"/>
               </a:solidFill>
@@ -4157,10 +4167,550 @@
           </a:p>
         </p:txBody>
       </p:sp>
+      <p:sp>
+        <p:nvSpPr>
+          <p:cNvPr id="3" name="TextBox 2"/>
+          <p:cNvSpPr txBox="1"/>
+          <p:nvPr/>
+        </p:nvSpPr>
+        <p:spPr>
+          <a:xfrm>
+            <a:off x="254833" y="1384995"/>
+            <a:ext cx="8184629" cy="646331"/>
+          </a:xfrm>
+          <a:prstGeom prst="rect">
+            <a:avLst/>
+          </a:prstGeom>
+          <a:noFill/>
+        </p:spPr>
+        <p:txBody>
+          <a:bodyPr wrap="square" rtlCol="0">
+            <a:spAutoFit/>
+          </a:bodyPr>
+          <a:lstStyle/>
+          <a:p>
+            <a:r>
+              <a:rPr lang="en-US" dirty="0" smtClean="0"/>
+              <a:t>Example: writing the first two characters of the </a:t>
+            </a:r>
+            <a:r>
+              <a:rPr lang="en-US" dirty="0" err="1" smtClean="0"/>
+              <a:t>everythingElse</a:t>
+            </a:r>
+            <a:r>
+              <a:rPr lang="en-US" dirty="0" smtClean="0"/>
+              <a:t> string to the buffer and then </a:t>
+            </a:r>
+            <a:r>
+              <a:rPr lang="en-US" dirty="0" err="1" smtClean="0"/>
+              <a:t>stdout</a:t>
+            </a:r>
+            <a:r>
+              <a:rPr lang="en-US" dirty="0" smtClean="0"/>
+              <a:t>:</a:t>
+            </a:r>
+            <a:endParaRPr lang="en-US" dirty="0"/>
+          </a:p>
+        </p:txBody>
+      </p:sp>
+      <p:pic>
+        <p:nvPicPr>
+          <p:cNvPr id="4" name="Picture 3" descr="C:\Users\kmc51\Google Drive\CS\CS1501 (1)\code\BinaryDriver.java - Notepad++"/>
+          <p:cNvPicPr>
+            <a:picLocks noChangeAspect="1"/>
+          </p:cNvPicPr>
+          <p:nvPr/>
+        </p:nvPicPr>
+        <p:blipFill rotWithShape="1">
+          <a:blip r:embed="rId2">
+            <a:extLst>
+              <a:ext uri="{28A0092B-C50C-407E-A947-70E740481C1C}">
+                <a14:useLocalDpi xmlns:a14="http://schemas.microsoft.com/office/drawing/2010/main" val="0"/>
+              </a:ext>
+            </a:extLst>
+          </a:blip>
+          <a:srcRect l="13886" t="51870" r="8824" b="15264"/>
+          <a:stretch/>
+        </p:blipFill>
+        <p:spPr>
+          <a:xfrm>
+            <a:off x="254833" y="2123659"/>
+            <a:ext cx="5271796" cy="1884785"/>
+          </a:xfrm>
+          <a:prstGeom prst="rect">
+            <a:avLst/>
+          </a:prstGeom>
+        </p:spPr>
+      </p:pic>
+      <p:pic>
+        <p:nvPicPr>
+          <p:cNvPr id="5" name="Picture 4" descr="arsenic.cs.pitt.edu - PuTTY"/>
+          <p:cNvPicPr>
+            <a:picLocks noChangeAspect="1"/>
+          </p:cNvPicPr>
+          <p:nvPr/>
+        </p:nvPicPr>
+        <p:blipFill rotWithShape="1">
+          <a:blip r:embed="rId3">
+            <a:extLst>
+              <a:ext uri="{28A0092B-C50C-407E-A947-70E740481C1C}">
+                <a14:useLocalDpi xmlns:a14="http://schemas.microsoft.com/office/drawing/2010/main" val="0"/>
+              </a:ext>
+            </a:extLst>
+          </a:blip>
+          <a:srcRect l="762" t="7246" r="12328" b="55886"/>
+          <a:stretch/>
+        </p:blipFill>
+        <p:spPr>
+          <a:xfrm>
+            <a:off x="254833" y="4152122"/>
+            <a:ext cx="7641771" cy="1548882"/>
+          </a:xfrm>
+          <a:prstGeom prst="rect">
+            <a:avLst/>
+          </a:prstGeom>
+        </p:spPr>
+      </p:pic>
+      <p:sp>
+        <p:nvSpPr>
+          <p:cNvPr id="6" name="TextBox 5"/>
+          <p:cNvSpPr txBox="1"/>
+          <p:nvPr/>
+        </p:nvSpPr>
+        <p:spPr>
+          <a:xfrm>
+            <a:off x="5803641" y="2123659"/>
+            <a:ext cx="3107094" cy="923330"/>
+          </a:xfrm>
+          <a:prstGeom prst="rect">
+            <a:avLst/>
+          </a:prstGeom>
+          <a:noFill/>
+        </p:spPr>
+        <p:txBody>
+          <a:bodyPr wrap="square" rtlCol="0">
+            <a:spAutoFit/>
+          </a:bodyPr>
+          <a:lstStyle/>
+          <a:p>
+            <a:r>
+              <a:rPr lang="en-US" dirty="0" smtClean="0"/>
+              <a:t>See lines 226-229, and 88-92 of </a:t>
+            </a:r>
+            <a:r>
+              <a:rPr lang="en-US" dirty="0" err="1" smtClean="0"/>
+              <a:t>BinaryStdOut</a:t>
+            </a:r>
+            <a:r>
+              <a:rPr lang="en-US" dirty="0" smtClean="0"/>
+              <a:t> for the called functions</a:t>
+            </a:r>
+            <a:endParaRPr lang="en-US" dirty="0"/>
+          </a:p>
+        </p:txBody>
+      </p:sp>
     </p:spTree>
     <p:extLst>
       <p:ext uri="{BB962C8B-B14F-4D97-AF65-F5344CB8AC3E}">
         <p14:creationId xmlns:p14="http://schemas.microsoft.com/office/powerpoint/2010/main" val="579924024"/>
+      </p:ext>
+    </p:extLst>
+  </p:cSld>
+  <p:clrMapOvr>
+    <a:masterClrMapping/>
+  </p:clrMapOvr>
+  <p:timing>
+    <p:tnLst>
+      <p:par>
+        <p:cTn id="1" dur="indefinite" restart="never" nodeType="tmRoot"/>
+      </p:par>
+    </p:tnLst>
+  </p:timing>
+</p:sld>
+</file>
+
+<file path=ppt/slides/slide13.xml><?xml version="1.0" encoding="utf-8"?>
+<p:sld xmlns:a="http://schemas.openxmlformats.org/drawingml/2006/main" xmlns:r="http://schemas.openxmlformats.org/officeDocument/2006/relationships" xmlns:p="http://schemas.openxmlformats.org/presentationml/2006/main">
+  <p:cSld>
+    <p:spTree>
+      <p:nvGrpSpPr>
+        <p:cNvPr id="1" name=""/>
+        <p:cNvGrpSpPr/>
+        <p:nvPr/>
+      </p:nvGrpSpPr>
+      <p:grpSpPr>
+        <a:xfrm>
+          <a:off x="0" y="0"/>
+          <a:ext cx="0" cy="0"/>
+          <a:chOff x="0" y="0"/>
+          <a:chExt cx="0" cy="0"/>
+        </a:xfrm>
+      </p:grpSpPr>
+      <p:sp>
+        <p:nvSpPr>
+          <p:cNvPr id="2" name="TextBox 1">
+            <a:extLst>
+              <a:ext uri="{FF2B5EF4-FFF2-40B4-BE49-F238E27FC236}">
+                <a16:creationId xmlns:a16="http://schemas.microsoft.com/office/drawing/2014/main" xmlns="" id="{4A12CE8E-C4BD-4176-B5E4-857C69559459}"/>
+              </a:ext>
+            </a:extLst>
+          </p:cNvPr>
+          <p:cNvSpPr txBox="1"/>
+          <p:nvPr/>
+        </p:nvSpPr>
+        <p:spPr>
+          <a:xfrm>
+            <a:off x="-76201" y="0"/>
+            <a:ext cx="8515663" cy="1292662"/>
+          </a:xfrm>
+          <a:prstGeom prst="rect">
+            <a:avLst/>
+          </a:prstGeom>
+        </p:spPr>
+        <p:txBody>
+          <a:bodyPr wrap="square" rtlCol="0">
+            <a:spAutoFit/>
+          </a:bodyPr>
+          <a:lstStyle/>
+          <a:p>
+            <a:r>
+              <a:rPr lang="en-US" sz="2600" u="sng" dirty="0" err="1" smtClean="0">
+                <a:solidFill>
+                  <a:srgbClr val="002060"/>
+                </a:solidFill>
+              </a:rPr>
+              <a:t>BinaryStdOut</a:t>
+            </a:r>
+            <a:r>
+              <a:rPr lang="en-US" sz="2600" dirty="0" smtClean="0">
+                <a:solidFill>
+                  <a:srgbClr val="002060"/>
+                </a:solidFill>
+              </a:rPr>
+              <a:t>: We can also write individual bits using the </a:t>
+            </a:r>
+            <a:r>
+              <a:rPr lang="en-US" sz="2600" dirty="0" err="1" smtClean="0">
+                <a:solidFill>
+                  <a:srgbClr val="002060"/>
+                </a:solidFill>
+              </a:rPr>
+              <a:t>writeBit</a:t>
+            </a:r>
+            <a:r>
+              <a:rPr lang="en-US" sz="2600" dirty="0" smtClean="0">
+                <a:solidFill>
+                  <a:srgbClr val="002060"/>
+                </a:solidFill>
+              </a:rPr>
+              <a:t> method (similar to what was accomplished in earlier slides using the ternary operator)</a:t>
+            </a:r>
+            <a:endParaRPr lang="en-US" sz="2600" dirty="0">
+              <a:solidFill>
+                <a:srgbClr val="002060"/>
+              </a:solidFill>
+            </a:endParaRPr>
+          </a:p>
+        </p:txBody>
+      </p:sp>
+      <p:sp>
+        <p:nvSpPr>
+          <p:cNvPr id="3" name="TextBox 2"/>
+          <p:cNvSpPr txBox="1"/>
+          <p:nvPr/>
+        </p:nvSpPr>
+        <p:spPr>
+          <a:xfrm>
+            <a:off x="254833" y="1384995"/>
+            <a:ext cx="8184629" cy="369332"/>
+          </a:xfrm>
+          <a:prstGeom prst="rect">
+            <a:avLst/>
+          </a:prstGeom>
+          <a:noFill/>
+        </p:spPr>
+        <p:txBody>
+          <a:bodyPr wrap="square" rtlCol="0">
+            <a:spAutoFit/>
+          </a:bodyPr>
+          <a:lstStyle/>
+          <a:p>
+            <a:r>
+              <a:rPr lang="en-US" dirty="0" smtClean="0"/>
+              <a:t>Example: writing </a:t>
+            </a:r>
+            <a:r>
+              <a:rPr lang="en-US" dirty="0" smtClean="0"/>
+              <a:t>a single “1” bit to </a:t>
+            </a:r>
+            <a:r>
+              <a:rPr lang="en-US" dirty="0" err="1" smtClean="0"/>
+              <a:t>stdout</a:t>
+            </a:r>
+            <a:r>
+              <a:rPr lang="en-US" dirty="0" smtClean="0"/>
+              <a:t> </a:t>
+            </a:r>
+            <a:endParaRPr lang="en-US" dirty="0"/>
+          </a:p>
+        </p:txBody>
+      </p:sp>
+      <p:pic>
+        <p:nvPicPr>
+          <p:cNvPr id="7" name="Picture 6" descr="C:\Users\kmc51\Google Drive\CS\CS1501 (1)\code\BinaryDriver.java - Notepad++"/>
+          <p:cNvPicPr>
+            <a:picLocks noChangeAspect="1"/>
+          </p:cNvPicPr>
+          <p:nvPr/>
+        </p:nvPicPr>
+        <p:blipFill rotWithShape="1">
+          <a:blip r:embed="rId2">
+            <a:extLst>
+              <a:ext uri="{28A0092B-C50C-407E-A947-70E740481C1C}">
+                <a14:useLocalDpi xmlns:a14="http://schemas.microsoft.com/office/drawing/2010/main" val="0"/>
+              </a:ext>
+            </a:extLst>
+          </a:blip>
+          <a:srcRect l="15118" t="41782" r="24967" b="23295"/>
+          <a:stretch/>
+        </p:blipFill>
+        <p:spPr>
+          <a:xfrm>
+            <a:off x="354562" y="1846660"/>
+            <a:ext cx="5212080" cy="1035280"/>
+          </a:xfrm>
+          <a:prstGeom prst="rect">
+            <a:avLst/>
+          </a:prstGeom>
+        </p:spPr>
+      </p:pic>
+      <p:sp>
+        <p:nvSpPr>
+          <p:cNvPr id="8" name="TextBox 7"/>
+          <p:cNvSpPr txBox="1"/>
+          <p:nvPr/>
+        </p:nvSpPr>
+        <p:spPr>
+          <a:xfrm>
+            <a:off x="254833" y="3032375"/>
+            <a:ext cx="8184629" cy="369332"/>
+          </a:xfrm>
+          <a:prstGeom prst="rect">
+            <a:avLst/>
+          </a:prstGeom>
+          <a:noFill/>
+        </p:spPr>
+        <p:txBody>
+          <a:bodyPr wrap="square" rtlCol="0">
+            <a:spAutoFit/>
+          </a:bodyPr>
+          <a:lstStyle/>
+          <a:p>
+            <a:r>
+              <a:rPr lang="en-US" dirty="0" smtClean="0"/>
+              <a:t>Output will look somewhat odd, since we didn’t write a full character:</a:t>
+            </a:r>
+            <a:endParaRPr lang="en-US" dirty="0"/>
+          </a:p>
+        </p:txBody>
+      </p:sp>
+      <p:pic>
+        <p:nvPicPr>
+          <p:cNvPr id="11" name="Picture 10" descr="arsenic.cs.pitt.edu - PuTTY"/>
+          <p:cNvPicPr>
+            <a:picLocks noChangeAspect="1"/>
+          </p:cNvPicPr>
+          <p:nvPr/>
+        </p:nvPicPr>
+        <p:blipFill rotWithShape="1">
+          <a:blip r:embed="rId3">
+            <a:extLst>
+              <a:ext uri="{28A0092B-C50C-407E-A947-70E740481C1C}">
+                <a14:useLocalDpi xmlns:a14="http://schemas.microsoft.com/office/drawing/2010/main" val="0"/>
+              </a:ext>
+            </a:extLst>
+          </a:blip>
+          <a:srcRect l="891" t="47140" r="11670" b="8884"/>
+          <a:stretch/>
+        </p:blipFill>
+        <p:spPr>
+          <a:xfrm>
+            <a:off x="337418" y="3401707"/>
+            <a:ext cx="7688424" cy="1847462"/>
+          </a:xfrm>
+          <a:prstGeom prst="rect">
+            <a:avLst/>
+          </a:prstGeom>
+        </p:spPr>
+      </p:pic>
+      <p:cxnSp>
+        <p:nvCxnSpPr>
+          <p:cNvPr id="13" name="Straight Arrow Connector 12"/>
+          <p:cNvCxnSpPr/>
+          <p:nvPr/>
+        </p:nvCxnSpPr>
+        <p:spPr>
+          <a:xfrm flipH="1">
+            <a:off x="494523" y="5001209"/>
+            <a:ext cx="905069" cy="0"/>
+          </a:xfrm>
+          <a:prstGeom prst="straightConnector1">
+            <a:avLst/>
+          </a:prstGeom>
+          <a:ln>
+            <a:tailEnd type="triangle"/>
+          </a:ln>
+        </p:spPr>
+        <p:style>
+          <a:lnRef idx="1">
+            <a:schemeClr val="accent1"/>
+          </a:lnRef>
+          <a:fillRef idx="0">
+            <a:schemeClr val="accent1"/>
+          </a:fillRef>
+          <a:effectRef idx="0">
+            <a:schemeClr val="accent1"/>
+          </a:effectRef>
+          <a:fontRef idx="minor">
+            <a:schemeClr val="tx1"/>
+          </a:fontRef>
+        </p:style>
+      </p:cxnSp>
+    </p:spTree>
+    <p:extLst>
+      <p:ext uri="{BB962C8B-B14F-4D97-AF65-F5344CB8AC3E}">
+        <p14:creationId xmlns:p14="http://schemas.microsoft.com/office/powerpoint/2010/main" val="1968471541"/>
+      </p:ext>
+    </p:extLst>
+  </p:cSld>
+  <p:clrMapOvr>
+    <a:masterClrMapping/>
+  </p:clrMapOvr>
+  <p:timing>
+    <p:tnLst>
+      <p:par>
+        <p:cTn id="1" dur="indefinite" restart="never" nodeType="tmRoot"/>
+      </p:par>
+    </p:tnLst>
+  </p:timing>
+</p:sld>
+</file>
+
+<file path=ppt/slides/slide14.xml><?xml version="1.0" encoding="utf-8"?>
+<p:sld xmlns:a="http://schemas.openxmlformats.org/drawingml/2006/main" xmlns:r="http://schemas.openxmlformats.org/officeDocument/2006/relationships" xmlns:p="http://schemas.openxmlformats.org/presentationml/2006/main">
+  <p:cSld>
+    <p:spTree>
+      <p:nvGrpSpPr>
+        <p:cNvPr id="1" name=""/>
+        <p:cNvGrpSpPr/>
+        <p:nvPr/>
+      </p:nvGrpSpPr>
+      <p:grpSpPr>
+        <a:xfrm>
+          <a:off x="0" y="0"/>
+          <a:ext cx="0" cy="0"/>
+          <a:chOff x="0" y="0"/>
+          <a:chExt cx="0" cy="0"/>
+        </a:xfrm>
+      </p:grpSpPr>
+      <p:sp>
+        <p:nvSpPr>
+          <p:cNvPr id="2" name="TextBox 1">
+            <a:extLst>
+              <a:ext uri="{FF2B5EF4-FFF2-40B4-BE49-F238E27FC236}">
+                <a16:creationId xmlns:a16="http://schemas.microsoft.com/office/drawing/2014/main" xmlns="" id="{4A12CE8E-C4BD-4176-B5E4-857C69559459}"/>
+              </a:ext>
+            </a:extLst>
+          </p:cNvPr>
+          <p:cNvSpPr txBox="1"/>
+          <p:nvPr/>
+        </p:nvSpPr>
+        <p:spPr>
+          <a:xfrm>
+            <a:off x="-76201" y="0"/>
+            <a:ext cx="8515663" cy="492443"/>
+          </a:xfrm>
+          <a:prstGeom prst="rect">
+            <a:avLst/>
+          </a:prstGeom>
+        </p:spPr>
+        <p:txBody>
+          <a:bodyPr wrap="square" rtlCol="0">
+            <a:spAutoFit/>
+          </a:bodyPr>
+          <a:lstStyle/>
+          <a:p>
+            <a:r>
+              <a:rPr lang="en-US" sz="2600" dirty="0" smtClean="0">
+                <a:solidFill>
+                  <a:srgbClr val="002060"/>
+                </a:solidFill>
+              </a:rPr>
+              <a:t>Some brief comments on the LZW project:</a:t>
+            </a:r>
+            <a:endParaRPr lang="en-US" sz="2600" dirty="0">
+              <a:solidFill>
+                <a:srgbClr val="002060"/>
+              </a:solidFill>
+            </a:endParaRPr>
+          </a:p>
+        </p:txBody>
+      </p:sp>
+      <p:sp>
+        <p:nvSpPr>
+          <p:cNvPr id="4" name="TextBox 3"/>
+          <p:cNvSpPr txBox="1"/>
+          <p:nvPr/>
+        </p:nvSpPr>
+        <p:spPr>
+          <a:xfrm>
+            <a:off x="643812" y="914400"/>
+            <a:ext cx="7557796" cy="2308324"/>
+          </a:xfrm>
+          <a:prstGeom prst="rect">
+            <a:avLst/>
+          </a:prstGeom>
+          <a:noFill/>
+        </p:spPr>
+        <p:txBody>
+          <a:bodyPr wrap="square" rtlCol="0">
+            <a:spAutoFit/>
+          </a:bodyPr>
+          <a:lstStyle/>
+          <a:p>
+            <a:pPr marL="342900" indent="-342900">
+              <a:buFont typeface="+mj-lt"/>
+              <a:buAutoNum type="arabicPeriod"/>
+            </a:pPr>
+            <a:r>
+              <a:rPr lang="en-US" sz="2400" dirty="0" smtClean="0"/>
+              <a:t>This is an assignment for which it may be especially important to plan out strategies in advance.</a:t>
+            </a:r>
+          </a:p>
+          <a:p>
+            <a:pPr marL="342900" indent="-342900">
+              <a:buFont typeface="+mj-lt"/>
+              <a:buAutoNum type="arabicPeriod"/>
+            </a:pPr>
+            <a:endParaRPr lang="en-US" sz="2400" dirty="0"/>
+          </a:p>
+          <a:p>
+            <a:pPr marL="342900" indent="-342900">
+              <a:buFont typeface="+mj-lt"/>
+              <a:buAutoNum type="arabicPeriod"/>
+            </a:pPr>
+            <a:r>
+              <a:rPr lang="en-US" sz="2400" dirty="0" smtClean="0"/>
+              <a:t>It may help to create some very small simple test files to try out, before moving on to the set of files that were given to you.</a:t>
+            </a:r>
+            <a:endParaRPr lang="en-US" sz="2400" dirty="0"/>
+          </a:p>
+        </p:txBody>
+      </p:sp>
+    </p:spTree>
+    <p:extLst>
+      <p:ext uri="{BB962C8B-B14F-4D97-AF65-F5344CB8AC3E}">
+        <p14:creationId xmlns:p14="http://schemas.microsoft.com/office/powerpoint/2010/main" val="1744664297"/>
       </p:ext>
     </p:extLst>
   </p:cSld>
@@ -4966,6 +5516,13 @@
   <p:clrMapOvr>
     <a:masterClrMapping/>
   </p:clrMapOvr>
+  <p:timing>
+    <p:tnLst>
+      <p:par>
+        <p:cTn id="1" dur="indefinite" restart="never" nodeType="tmRoot"/>
+      </p:par>
+    </p:tnLst>
+  </p:timing>
 </p:sld>
 </file>
 

</xml_diff>